<commit_message>
Mise à jour du journal + ajout d'une note pour la défense
</commit_message>
<xml_diff>
--- a/00-Documentation/05-Présentation/P-TPI-Alexandre King.pptx
+++ b/00-Documentation/05-Présentation/P-TPI-Alexandre King.pptx
@@ -257,7 +257,7 @@
             <a:pPr rtl="0"/>
             <a:fld id="{29D3BBD2-794C-43E3-8362-720D61104479}" type="datetime1">
               <a:rPr lang="de-DE" smtClean="0"/>
-              <a:t>21.03.2024</a:t>
+              <a:t>23.05.2024</a:t>
             </a:fld>
             <a:endParaRPr lang="de-DE" dirty="0"/>
           </a:p>
@@ -438,7 +438,7 @@
             <a:fld id="{AF43A590-B97D-4BAF-9F3E-EEA7B3B9DE95}" type="datetime1">
               <a:rPr lang="de-DE" smtClean="0"/>
               <a:pPr/>
-              <a:t>21.03.2024</a:t>
+              <a:t>23.05.2024</a:t>
             </a:fld>
             <a:endParaRPr lang="de-DE" dirty="0"/>
           </a:p>
@@ -1959,7 +1959,7 @@
             <a:pPr rtl="0"/>
             <a:fld id="{94C5B48D-1595-4AE5-99BE-B4F81BDE0E43}" type="datetime1">
               <a:rPr lang="de-DE" noProof="0" smtClean="0"/>
-              <a:t>21.03.2024</a:t>
+              <a:t>23.05.2024</a:t>
             </a:fld>
             <a:endParaRPr lang="de-DE" noProof="0" dirty="0"/>
           </a:p>
@@ -2163,7 +2163,7 @@
             <a:pPr rtl="0"/>
             <a:fld id="{15A7CF3B-DF02-45CA-B230-36D076F988CB}" type="datetime1">
               <a:rPr lang="de-DE" noProof="0" smtClean="0"/>
-              <a:t>21.03.2024</a:t>
+              <a:t>23.05.2024</a:t>
             </a:fld>
             <a:endParaRPr lang="de-DE" noProof="0" dirty="0"/>
           </a:p>
@@ -2377,7 +2377,7 @@
             <a:pPr rtl="0"/>
             <a:fld id="{7C365999-2290-4E60-992D-296ECB78F257}" type="datetime1">
               <a:rPr lang="de-DE" noProof="0" smtClean="0"/>
-              <a:t>21.03.2024</a:t>
+              <a:t>23.05.2024</a:t>
             </a:fld>
             <a:endParaRPr lang="de-DE" noProof="0" dirty="0"/>
           </a:p>
@@ -2581,7 +2581,7 @@
             <a:pPr rtl="0"/>
             <a:fld id="{22ADF625-E924-4E28-AB29-79F5A373A66E}" type="datetime1">
               <a:rPr lang="de-DE" noProof="0" smtClean="0"/>
-              <a:t>21.03.2024</a:t>
+              <a:t>23.05.2024</a:t>
             </a:fld>
             <a:endParaRPr lang="de-DE" noProof="0" dirty="0"/>
           </a:p>
@@ -2861,7 +2861,7 @@
             <a:pPr rtl="0"/>
             <a:fld id="{7FB0ED4E-F720-4940-9CF6-0E0E03C44619}" type="datetime1">
               <a:rPr lang="de-DE" noProof="0" smtClean="0"/>
-              <a:t>21.03.2024</a:t>
+              <a:t>23.05.2024</a:t>
             </a:fld>
             <a:endParaRPr lang="de-DE" noProof="0" dirty="0"/>
           </a:p>
@@ -3133,7 +3133,7 @@
             <a:pPr rtl="0"/>
             <a:fld id="{8317CE92-BA86-47A5-BE5E-D9B9ACFE7127}" type="datetime1">
               <a:rPr lang="de-DE" noProof="0" smtClean="0"/>
-              <a:t>21.03.2024</a:t>
+              <a:t>23.05.2024</a:t>
             </a:fld>
             <a:endParaRPr lang="de-DE" noProof="0" dirty="0"/>
           </a:p>
@@ -3552,7 +3552,7 @@
             <a:pPr rtl="0"/>
             <a:fld id="{D6A74D19-B73F-4989-9865-5AA17C14CF23}" type="datetime1">
               <a:rPr lang="de-DE" noProof="0" smtClean="0"/>
-              <a:t>21.03.2024</a:t>
+              <a:t>23.05.2024</a:t>
             </a:fld>
             <a:endParaRPr lang="de-DE" noProof="0" dirty="0"/>
           </a:p>
@@ -3698,7 +3698,7 @@
             <a:pPr rtl="0"/>
             <a:fld id="{B51C9E94-BB9D-4990-BC94-06DE9342F154}" type="datetime1">
               <a:rPr lang="de-DE" noProof="0" smtClean="0"/>
-              <a:t>21.03.2024</a:t>
+              <a:t>23.05.2024</a:t>
             </a:fld>
             <a:endParaRPr lang="de-DE" noProof="0" dirty="0"/>
           </a:p>
@@ -3814,7 +3814,7 @@
             <a:pPr rtl="0"/>
             <a:fld id="{DF7269F5-2A87-4F03-A051-B4072EE42F74}" type="datetime1">
               <a:rPr lang="de-DE" noProof="0" smtClean="0"/>
-              <a:t>21.03.2024</a:t>
+              <a:t>23.05.2024</a:t>
             </a:fld>
             <a:endParaRPr lang="de-DE" noProof="0" dirty="0"/>
           </a:p>
@@ -4131,7 +4131,7 @@
             <a:pPr rtl="0"/>
             <a:fld id="{7890EACE-40FC-4E9B-8BD7-2D421E031484}" type="datetime1">
               <a:rPr lang="de-DE" noProof="0" smtClean="0"/>
-              <a:t>21.03.2024</a:t>
+              <a:t>23.05.2024</a:t>
             </a:fld>
             <a:endParaRPr lang="de-DE" noProof="0" dirty="0"/>
           </a:p>
@@ -4429,7 +4429,7 @@
             <a:pPr rtl="0"/>
             <a:fld id="{3C49C316-295D-44C0-A987-EA6FDFAADBCB}" type="datetime1">
               <a:rPr lang="de-DE" noProof="0" smtClean="0"/>
-              <a:t>21.03.2024</a:t>
+              <a:t>23.05.2024</a:t>
             </a:fld>
             <a:endParaRPr lang="de-DE" noProof="0" dirty="0"/>
           </a:p>
@@ -4674,7 +4674,7 @@
             <a:pPr rtl="0"/>
             <a:fld id="{32BE735C-FA27-4E5F-8CFA-ECD4A52F4D2C}" type="datetime1">
               <a:rPr lang="de-DE" noProof="0" smtClean="0"/>
-              <a:t>21.03.2024</a:t>
+              <a:t>23.05.2024</a:t>
             </a:fld>
             <a:endParaRPr lang="de-DE" noProof="0" dirty="0"/>
           </a:p>
@@ -32345,8 +32345,8 @@
         </p:nvSpPr>
         <p:spPr>
           <a:xfrm>
-            <a:off x="405534" y="4618935"/>
-            <a:ext cx="1739752" cy="467051"/>
+            <a:off x="405534" y="4740763"/>
+            <a:ext cx="1739752" cy="223394"/>
           </a:xfrm>
           <a:prstGeom prst="rect">
             <a:avLst/>
@@ -32373,55 +32373,7 @@
                 </a:solidFill>
                 <a:cs typeface="Segoe UI" panose="020B0502040204020203" pitchFamily="34" charset="0"/>
               </a:rPr>
-              <a:t>Mise en place du MVC, </a:t>
-            </a:r>
-            <a:r>
-              <a:rPr lang="fr-CH" sz="1400" dirty="0" err="1">
-                <a:solidFill>
-                  <a:schemeClr val="tx1">
-                    <a:lumMod val="75000"/>
-                    <a:lumOff val="25000"/>
-                  </a:schemeClr>
-                </a:solidFill>
-                <a:cs typeface="Segoe UI" panose="020B0502040204020203" pitchFamily="34" charset="0"/>
-              </a:rPr>
-              <a:t>Tailwind</a:t>
-            </a:r>
-            <a:r>
-              <a:rPr lang="fr-CH" sz="1400" dirty="0">
-                <a:solidFill>
-                  <a:schemeClr val="tx1">
-                    <a:lumMod val="75000"/>
-                    <a:lumOff val="25000"/>
-                  </a:schemeClr>
-                </a:solidFill>
-                <a:cs typeface="Segoe UI" panose="020B0502040204020203" pitchFamily="34" charset="0"/>
-              </a:rPr>
-              <a:t>, </a:t>
-            </a:r>
-            <a:r>
-              <a:rPr lang="fr-CH" sz="1400" dirty="0" err="1">
-                <a:solidFill>
-                  <a:schemeClr val="tx1">
-                    <a:lumMod val="75000"/>
-                    <a:lumOff val="25000"/>
-                  </a:schemeClr>
-                </a:solidFill>
-                <a:cs typeface="Segoe UI" panose="020B0502040204020203" pitchFamily="34" charset="0"/>
-              </a:rPr>
-              <a:t>uWamp</a:t>
-            </a:r>
-            <a:r>
-              <a:rPr lang="fr-CH" sz="1400" dirty="0">
-                <a:solidFill>
-                  <a:schemeClr val="tx1">
-                    <a:lumMod val="75000"/>
-                    <a:lumOff val="25000"/>
-                  </a:schemeClr>
-                </a:solidFill>
-                <a:cs typeface="Segoe UI" panose="020B0502040204020203" pitchFamily="34" charset="0"/>
-              </a:rPr>
-              <a:t>, DB</a:t>
+              <a:t>Parler du git</a:t>
             </a:r>
           </a:p>
         </p:txBody>

</xml_diff>